<commit_message>
added more diagrams and generated tools for making additional illustrations
</commit_message>
<xml_diff>
--- a/module-04-manhattan/slides/01-coordinates-on-the-grid.pptx
+++ b/module-04-manhattan/slides/01-coordinates-on-the-grid.pptx
@@ -4949,6 +4949,30 @@
           </a:p>
         </p:txBody>
       </p:sp>
+      <p:pic>
+        <p:nvPicPr>
+          <p:cNvPr id="7" name="Picture 6" descr="labeled-grid-4x4.png"/>
+          <p:cNvPicPr>
+            <a:picLocks noChangeAspect="1"/>
+          </p:cNvPicPr>
+          <p:nvPr/>
+        </p:nvPicPr>
+        <p:blipFill>
+          <a:blip r:embed="rId2"/>
+          <a:stretch>
+            <a:fillRect/>
+          </a:stretch>
+        </p:blipFill>
+        <p:spPr>
+          <a:xfrm>
+            <a:off x="1371600" y="1371600"/>
+            <a:ext cx="4572000" cy="4589755"/>
+          </a:xfrm>
+          <a:prstGeom prst="rect">
+            <a:avLst/>
+          </a:prstGeom>
+        </p:spPr>
+      </p:pic>
     </p:spTree>
   </p:cSld>
   <p:clrMapOvr>

</xml_diff>